<commit_message>
presentation update P1 finished
</commit_message>
<xml_diff>
--- a/Presentation.pptx
+++ b/Presentation.pptx
@@ -20,6 +20,7 @@
     <p:sldId id="267" r:id="rId14"/>
     <p:sldId id="268" r:id="rId15"/>
     <p:sldId id="269" r:id="rId16"/>
+    <p:sldId id="274" r:id="rId17"/>
   </p:sldIdLst>
   <p:sldSz cx="12192000" cy="6858000"/>
   <p:notesSz cx="6858000" cy="9144000"/>
@@ -273,7 +274,7 @@
           <a:p>
             <a:fld id="{FE400534-9B4E-43CC-9E90-F3FF0615A88D}" type="datetimeFigureOut">
               <a:rPr lang="en-US" smtClean="0"/>
-              <a:t>10/27/2018</a:t>
+              <a:t>10/28/2018</a:t>
             </a:fld>
             <a:endParaRPr lang="en-US"/>
           </a:p>
@@ -476,7 +477,7 @@
           <a:p>
             <a:fld id="{FE400534-9B4E-43CC-9E90-F3FF0615A88D}" type="datetimeFigureOut">
               <a:rPr lang="en-US" smtClean="0"/>
-              <a:t>10/27/2018</a:t>
+              <a:t>10/28/2018</a:t>
             </a:fld>
             <a:endParaRPr lang="en-US"/>
           </a:p>
@@ -684,7 +685,7 @@
           <a:p>
             <a:fld id="{FE400534-9B4E-43CC-9E90-F3FF0615A88D}" type="datetimeFigureOut">
               <a:rPr lang="en-US" smtClean="0"/>
-              <a:t>10/27/2018</a:t>
+              <a:t>10/28/2018</a:t>
             </a:fld>
             <a:endParaRPr lang="en-US"/>
           </a:p>
@@ -882,7 +883,7 @@
           <a:p>
             <a:fld id="{FE400534-9B4E-43CC-9E90-F3FF0615A88D}" type="datetimeFigureOut">
               <a:rPr lang="en-US" smtClean="0"/>
-              <a:t>10/27/2018</a:t>
+              <a:t>10/28/2018</a:t>
             </a:fld>
             <a:endParaRPr lang="en-US"/>
           </a:p>
@@ -1157,7 +1158,7 @@
           <a:p>
             <a:fld id="{FE400534-9B4E-43CC-9E90-F3FF0615A88D}" type="datetimeFigureOut">
               <a:rPr lang="en-US" smtClean="0"/>
-              <a:t>10/27/2018</a:t>
+              <a:t>10/28/2018</a:t>
             </a:fld>
             <a:endParaRPr lang="en-US"/>
           </a:p>
@@ -1427,7 +1428,7 @@
           <a:p>
             <a:fld id="{FE400534-9B4E-43CC-9E90-F3FF0615A88D}" type="datetimeFigureOut">
               <a:rPr lang="en-US" smtClean="0"/>
-              <a:t>10/27/2018</a:t>
+              <a:t>10/28/2018</a:t>
             </a:fld>
             <a:endParaRPr lang="en-US"/>
           </a:p>
@@ -1839,7 +1840,7 @@
           <a:p>
             <a:fld id="{FE400534-9B4E-43CC-9E90-F3FF0615A88D}" type="datetimeFigureOut">
               <a:rPr lang="en-US" smtClean="0"/>
-              <a:t>10/27/2018</a:t>
+              <a:t>10/28/2018</a:t>
             </a:fld>
             <a:endParaRPr lang="en-US"/>
           </a:p>
@@ -1980,7 +1981,7 @@
           <a:p>
             <a:fld id="{FE400534-9B4E-43CC-9E90-F3FF0615A88D}" type="datetimeFigureOut">
               <a:rPr lang="en-US" smtClean="0"/>
-              <a:t>10/27/2018</a:t>
+              <a:t>10/28/2018</a:t>
             </a:fld>
             <a:endParaRPr lang="en-US"/>
           </a:p>
@@ -2093,7 +2094,7 @@
           <a:p>
             <a:fld id="{FE400534-9B4E-43CC-9E90-F3FF0615A88D}" type="datetimeFigureOut">
               <a:rPr lang="en-US" smtClean="0"/>
-              <a:t>10/27/2018</a:t>
+              <a:t>10/28/2018</a:t>
             </a:fld>
             <a:endParaRPr lang="en-US"/>
           </a:p>
@@ -2404,7 +2405,7 @@
           <a:p>
             <a:fld id="{FE400534-9B4E-43CC-9E90-F3FF0615A88D}" type="datetimeFigureOut">
               <a:rPr lang="en-US" smtClean="0"/>
-              <a:t>10/27/2018</a:t>
+              <a:t>10/28/2018</a:t>
             </a:fld>
             <a:endParaRPr lang="en-US"/>
           </a:p>
@@ -2692,7 +2693,7 @@
           <a:p>
             <a:fld id="{FE400534-9B4E-43CC-9E90-F3FF0615A88D}" type="datetimeFigureOut">
               <a:rPr lang="en-US" smtClean="0"/>
-              <a:t>10/27/2018</a:t>
+              <a:t>10/28/2018</a:t>
             </a:fld>
             <a:endParaRPr lang="en-US"/>
           </a:p>
@@ -2933,7 +2934,7 @@
           <a:p>
             <a:fld id="{FE400534-9B4E-43CC-9E90-F3FF0615A88D}" type="datetimeFigureOut">
               <a:rPr lang="en-US" smtClean="0"/>
-              <a:t>10/27/2018</a:t>
+              <a:t>10/28/2018</a:t>
             </a:fld>
             <a:endParaRPr lang="en-US"/>
           </a:p>
@@ -4352,13 +4353,13 @@
           <a:p>
             <a:r>
               <a:rPr lang="en-US" dirty="0"/>
-              <a:t>There was a few questions on the survey that asked participants to rank (for instance what benefits are important to you in a job) from 1-10</a:t>
+              <a:t>There were a few questions on the survey that asked participants to rank (for instance what benefits are important to you in a job) on a scale from 1-10</a:t>
             </a:r>
           </a:p>
           <a:p>
             <a:r>
               <a:rPr lang="en-US" dirty="0"/>
-              <a:t>Same thing as past slide 	</a:t>
+              <a:t>I coded this similar to the last slide	</a:t>
             </a:r>
             <a:r>
               <a:rPr lang="en-US" dirty="0" err="1"/>
@@ -4472,7 +4473,7 @@
             </a:r>
             <a:r>
               <a:rPr lang="en-US" dirty="0"/>
-              <a:t> and made it so that when it prints out the tree it outputs  </a:t>
+              <a:t> and made it so that when the tree is asked to print itself it outputs something like the picture below  </a:t>
             </a:r>
           </a:p>
         </p:txBody>
@@ -4504,7 +4505,7 @@
         </p:blipFill>
         <p:spPr>
           <a:xfrm>
-            <a:off x="4261096" y="3429000"/>
+            <a:off x="4009655" y="3198180"/>
             <a:ext cx="4172690" cy="2676102"/>
           </a:xfrm>
           <a:prstGeom prst="rect">
@@ -4594,7 +4595,33 @@
           <a:p>
             <a:r>
               <a:rPr lang="en-US" dirty="0"/>
-              <a:t>In the code I changed the piece that returns how likely it is to be true to returning what it thinks the average satisfaction is</a:t>
+              <a:t>I added support for the Likert scale when a class is chosen that has a Likert scale for its values</a:t>
+            </a:r>
+          </a:p>
+          <a:p>
+            <a:endParaRPr lang="en-US" dirty="0"/>
+          </a:p>
+          <a:p>
+            <a:r>
+              <a:rPr lang="en-US" dirty="0"/>
+              <a:t>Meaning that when you get to a leaf node it will tell you what it thinks your job satisfaction will be from 1-5</a:t>
+            </a:r>
+          </a:p>
+          <a:p>
+            <a:endParaRPr lang="en-US" dirty="0"/>
+          </a:p>
+          <a:p>
+            <a:r>
+              <a:rPr lang="en-US" dirty="0"/>
+              <a:t>Another small change I made to the algorithm is allowing it to handle values of </a:t>
+            </a:r>
+            <a:r>
+              <a:rPr lang="en-US" dirty="0" err="1"/>
+              <a:t>NaN</a:t>
+            </a:r>
+            <a:r>
+              <a:rPr lang="en-US" dirty="0"/>
+              <a:t> (So I don’t have to throw away these rows)</a:t>
             </a:r>
           </a:p>
         </p:txBody>
@@ -4855,7 +4882,7 @@
           <a:p>
             <a:r>
               <a:rPr lang="en-US" dirty="0"/>
-              <a:t>I think get the idea</a:t>
+              <a:t>Pretty tree #3</a:t>
             </a:r>
           </a:p>
         </p:txBody>
@@ -4864,6 +4891,95 @@
     <p:extLst>
       <p:ext uri="{BB962C8B-B14F-4D97-AF65-F5344CB8AC3E}">
         <p14:creationId xmlns:p14="http://schemas.microsoft.com/office/powerpoint/2010/main" val="2548148509"/>
+      </p:ext>
+    </p:extLst>
+  </p:cSld>
+  <p:clrMapOvr>
+    <a:masterClrMapping/>
+  </p:clrMapOvr>
+</p:sld>
+</file>
+
+<file path=ppt/slides/slide16.xml><?xml version="1.0" encoding="utf-8"?>
+<p:sld xmlns:a="http://schemas.openxmlformats.org/drawingml/2006/main" xmlns:r="http://schemas.openxmlformats.org/officeDocument/2006/relationships" xmlns:p="http://schemas.openxmlformats.org/presentationml/2006/main">
+  <p:cSld>
+    <p:spTree>
+      <p:nvGrpSpPr>
+        <p:cNvPr id="1" name=""/>
+        <p:cNvGrpSpPr/>
+        <p:nvPr/>
+      </p:nvGrpSpPr>
+      <p:grpSpPr>
+        <a:xfrm>
+          <a:off x="0" y="0"/>
+          <a:ext cx="0" cy="0"/>
+          <a:chOff x="0" y="0"/>
+          <a:chExt cx="0" cy="0"/>
+        </a:xfrm>
+      </p:grpSpPr>
+      <p:sp>
+        <p:nvSpPr>
+          <p:cNvPr id="2" name="Title 1">
+            <a:extLst>
+              <a:ext uri="{FF2B5EF4-FFF2-40B4-BE49-F238E27FC236}">
+                <a16:creationId xmlns:a16="http://schemas.microsoft.com/office/drawing/2014/main" id="{F108E78F-0453-4941-ADE2-C28F73557BDC}"/>
+              </a:ext>
+            </a:extLst>
+          </p:cNvPr>
+          <p:cNvSpPr>
+            <a:spLocks noGrp="1"/>
+          </p:cNvSpPr>
+          <p:nvPr>
+            <p:ph type="title"/>
+          </p:nvPr>
+        </p:nvSpPr>
+        <p:spPr/>
+        <p:txBody>
+          <a:bodyPr/>
+          <a:lstStyle/>
+          <a:p>
+            <a:r>
+              <a:rPr lang="en-US" dirty="0"/>
+              <a:t>Results (Student)</a:t>
+            </a:r>
+          </a:p>
+        </p:txBody>
+      </p:sp>
+      <p:sp>
+        <p:nvSpPr>
+          <p:cNvPr id="3" name="Content Placeholder 2">
+            <a:extLst>
+              <a:ext uri="{FF2B5EF4-FFF2-40B4-BE49-F238E27FC236}">
+                <a16:creationId xmlns:a16="http://schemas.microsoft.com/office/drawing/2014/main" id="{715D635C-2DEE-4F43-A702-2CE776813E30}"/>
+              </a:ext>
+            </a:extLst>
+          </p:cNvPr>
+          <p:cNvSpPr>
+            <a:spLocks noGrp="1"/>
+          </p:cNvSpPr>
+          <p:nvPr>
+            <p:ph idx="1"/>
+          </p:nvPr>
+        </p:nvSpPr>
+        <p:spPr/>
+        <p:txBody>
+          <a:bodyPr/>
+          <a:lstStyle/>
+          <a:p>
+            <a:r>
+              <a:rPr lang="en-US" dirty="0"/>
+              <a:t>I think get the idea</a:t>
+            </a:r>
+          </a:p>
+          <a:p>
+            <a:endParaRPr lang="en-US" dirty="0"/>
+          </a:p>
+        </p:txBody>
+      </p:sp>
+    </p:spTree>
+    <p:extLst>
+      <p:ext uri="{BB962C8B-B14F-4D97-AF65-F5344CB8AC3E}">
+        <p14:creationId xmlns:p14="http://schemas.microsoft.com/office/powerpoint/2010/main" val="1031475963"/>
       </p:ext>
     </p:extLst>
   </p:cSld>
@@ -4952,7 +5068,7 @@
           <a:p>
             <a:r>
               <a:rPr lang="en-US" dirty="0"/>
-              <a:t>Supposed to write this last</a:t>
+              <a:t>To be written at the end of the project</a:t>
             </a:r>
           </a:p>
         </p:txBody>
@@ -5039,7 +5155,7 @@
           <a:p>
             <a:r>
               <a:rPr lang="en-US" dirty="0"/>
-              <a:t>Writing this last again</a:t>
+              <a:t>To be written at the end of the project</a:t>
             </a:r>
           </a:p>
         </p:txBody>
@@ -5135,7 +5251,7 @@
           <a:p>
             <a:r>
               <a:rPr lang="en-US" dirty="0"/>
-              <a:t>Supervised learning problems are problems </a:t>
+              <a:t>Supervised learning solves problems that answer the question of why is my data like this</a:t>
             </a:r>
           </a:p>
           <a:p>
@@ -5220,9 +5336,8 @@
           <a:p>
             <a:r>
               <a:rPr lang="en-US" dirty="0"/>
-              <a:t>What’s ID3</a:t>
-            </a:r>
-            <a:endParaRPr lang="en-US"/>
+              <a:t>What’s ID3?</a:t>
+            </a:r>
           </a:p>
         </p:txBody>
       </p:sp>
@@ -5408,7 +5523,7 @@
         <p:spPr>
           <a:xfrm>
             <a:off x="838200" y="2006353"/>
-            <a:ext cx="5257800" cy="1384995"/>
+            <a:ext cx="5257800" cy="3108543"/>
           </a:xfrm>
           <a:prstGeom prst="rect">
             <a:avLst/>
@@ -5424,6 +5539,15 @@
             <a:r>
               <a:rPr lang="en-US" sz="2800" dirty="0"/>
               <a:t>Stack Overflow is a Q&amp;A website where developers can learn from each other</a:t>
+            </a:r>
+          </a:p>
+          <a:p>
+            <a:endParaRPr lang="en-US" sz="2800" dirty="0"/>
+          </a:p>
+          <a:p>
+            <a:r>
+              <a:rPr lang="en-US" sz="2800" dirty="0"/>
+              <a:t>Every year they release a survey that asks developers question about their job</a:t>
             </a:r>
           </a:p>
         </p:txBody>
@@ -5482,7 +5606,7 @@
             <a:pPr algn="ctr"/>
             <a:r>
               <a:rPr lang="en-US" dirty="0"/>
-              <a:t>About that data?</a:t>
+              <a:t>What do they ask about?</a:t>
             </a:r>
           </a:p>
         </p:txBody>
@@ -5507,18 +5631,6 @@
         <p:txBody>
           <a:bodyPr/>
           <a:lstStyle/>
-          <a:p>
-            <a:r>
-              <a:rPr lang="en-US" dirty="0"/>
-              <a:t>Stack Overflow also does surveys of their developers yearly</a:t>
-            </a:r>
-          </a:p>
-          <a:p>
-            <a:pPr marL="0" indent="0">
-              <a:buNone/>
-            </a:pPr>
-            <a:endParaRPr lang="en-US" dirty="0"/>
-          </a:p>
           <a:p>
             <a:r>
               <a:rPr lang="en-US" dirty="0"/>
@@ -5643,11 +5755,22 @@
           <a:p>
             <a:r>
               <a:rPr lang="en-US" dirty="0"/>
-              <a:t>I converted the csv so that if it says something like undecided I made it into a 3</a:t>
-            </a:r>
-          </a:p>
-          <a:p>
-            <a:endParaRPr lang="en-US" dirty="0"/>
+              <a:t>For instance take a question like “Are you extremely satisfied with your current job?” The answers they gave answers similar to what’s above</a:t>
+            </a:r>
+          </a:p>
+          <a:p>
+            <a:r>
+              <a:rPr lang="en-US" dirty="0"/>
+              <a:t>I converted the answers the dataset gave into </a:t>
+            </a:r>
+            <a:r>
+              <a:rPr lang="en-US" dirty="0" err="1"/>
+              <a:t>numeraical</a:t>
+            </a:r>
+            <a:r>
+              <a:rPr lang="en-US" dirty="0"/>
+              <a:t> values so that if an answer is undecided I made it into a 3</a:t>
+            </a:r>
           </a:p>
           <a:p>
             <a:r>
@@ -5777,22 +5900,25 @@
             <p:ph idx="1"/>
           </p:nvPr>
         </p:nvSpPr>
-        <p:spPr/>
+        <p:spPr>
+          <a:xfrm>
+            <a:off x="838200" y="1825625"/>
+            <a:ext cx="10515600" cy="4351338"/>
+          </a:xfrm>
+        </p:spPr>
         <p:txBody>
           <a:bodyPr/>
           <a:lstStyle/>
           <a:p>
             <a:r>
               <a:rPr lang="en-US" dirty="0"/>
-              <a:t>Data for columns like </a:t>
-            </a:r>
-            <a:r>
-              <a:rPr lang="en-US" dirty="0" err="1"/>
-              <a:t>DevType</a:t>
-            </a:r>
+              <a:t>They also asked questions like “Which of the following developer types describe you? Please select all that apply.”</a:t>
+            </a:r>
+          </a:p>
+          <a:p>
             <a:r>
               <a:rPr lang="en-US" dirty="0"/>
-              <a:t> came in as Full </a:t>
+              <a:t>The way Stack Overflow stored this is something like “Full </a:t>
             </a:r>
             <a:r>
               <a:rPr lang="en-US" dirty="0" err="1"/>
@@ -5808,7 +5934,7 @@
             </a:r>
             <a:r>
               <a:rPr lang="en-US" dirty="0"/>
-              <a:t> </a:t>
+              <a:t>”</a:t>
             </a:r>
           </a:p>
           <a:p>
@@ -5840,13 +5966,13 @@
           <p:nvPr>
             <p:extLst>
               <p:ext uri="{D42A27DB-BD31-4B8C-83A1-F6EECF244321}">
-                <p14:modId xmlns:p14="http://schemas.microsoft.com/office/powerpoint/2010/main" val="4101092670"/>
+                <p14:modId xmlns:p14="http://schemas.microsoft.com/office/powerpoint/2010/main" val="624950855"/>
               </p:ext>
             </p:extLst>
           </p:nvPr>
         </p:nvGraphicFramePr>
         <p:xfrm>
-          <a:off x="1013533" y="4181957"/>
+          <a:off x="838200" y="4874415"/>
           <a:ext cx="10164933" cy="1112520"/>
         </p:xfrm>
         <a:graphic>

</xml_diff>

<commit_message>
updates to paper and small changes to presentation
</commit_message>
<xml_diff>
--- a/Presentation.pptx
+++ b/Presentation.pptx
@@ -274,7 +274,7 @@
           <a:p>
             <a:fld id="{FE400534-9B4E-43CC-9E90-F3FF0615A88D}" type="datetimeFigureOut">
               <a:rPr lang="en-US" smtClean="0"/>
-              <a:t>10/28/2018</a:t>
+              <a:t>10/30/2018</a:t>
             </a:fld>
             <a:endParaRPr lang="en-US"/>
           </a:p>
@@ -477,7 +477,7 @@
           <a:p>
             <a:fld id="{FE400534-9B4E-43CC-9E90-F3FF0615A88D}" type="datetimeFigureOut">
               <a:rPr lang="en-US" smtClean="0"/>
-              <a:t>10/28/2018</a:t>
+              <a:t>10/30/2018</a:t>
             </a:fld>
             <a:endParaRPr lang="en-US"/>
           </a:p>
@@ -685,7 +685,7 @@
           <a:p>
             <a:fld id="{FE400534-9B4E-43CC-9E90-F3FF0615A88D}" type="datetimeFigureOut">
               <a:rPr lang="en-US" smtClean="0"/>
-              <a:t>10/28/2018</a:t>
+              <a:t>10/30/2018</a:t>
             </a:fld>
             <a:endParaRPr lang="en-US"/>
           </a:p>
@@ -883,7 +883,7 @@
           <a:p>
             <a:fld id="{FE400534-9B4E-43CC-9E90-F3FF0615A88D}" type="datetimeFigureOut">
               <a:rPr lang="en-US" smtClean="0"/>
-              <a:t>10/28/2018</a:t>
+              <a:t>10/30/2018</a:t>
             </a:fld>
             <a:endParaRPr lang="en-US"/>
           </a:p>
@@ -1158,7 +1158,7 @@
           <a:p>
             <a:fld id="{FE400534-9B4E-43CC-9E90-F3FF0615A88D}" type="datetimeFigureOut">
               <a:rPr lang="en-US" smtClean="0"/>
-              <a:t>10/28/2018</a:t>
+              <a:t>10/30/2018</a:t>
             </a:fld>
             <a:endParaRPr lang="en-US"/>
           </a:p>
@@ -1428,7 +1428,7 @@
           <a:p>
             <a:fld id="{FE400534-9B4E-43CC-9E90-F3FF0615A88D}" type="datetimeFigureOut">
               <a:rPr lang="en-US" smtClean="0"/>
-              <a:t>10/28/2018</a:t>
+              <a:t>10/30/2018</a:t>
             </a:fld>
             <a:endParaRPr lang="en-US"/>
           </a:p>
@@ -1840,7 +1840,7 @@
           <a:p>
             <a:fld id="{FE400534-9B4E-43CC-9E90-F3FF0615A88D}" type="datetimeFigureOut">
               <a:rPr lang="en-US" smtClean="0"/>
-              <a:t>10/28/2018</a:t>
+              <a:t>10/30/2018</a:t>
             </a:fld>
             <a:endParaRPr lang="en-US"/>
           </a:p>
@@ -1981,7 +1981,7 @@
           <a:p>
             <a:fld id="{FE400534-9B4E-43CC-9E90-F3FF0615A88D}" type="datetimeFigureOut">
               <a:rPr lang="en-US" smtClean="0"/>
-              <a:t>10/28/2018</a:t>
+              <a:t>10/30/2018</a:t>
             </a:fld>
             <a:endParaRPr lang="en-US"/>
           </a:p>
@@ -2094,7 +2094,7 @@
           <a:p>
             <a:fld id="{FE400534-9B4E-43CC-9E90-F3FF0615A88D}" type="datetimeFigureOut">
               <a:rPr lang="en-US" smtClean="0"/>
-              <a:t>10/28/2018</a:t>
+              <a:t>10/30/2018</a:t>
             </a:fld>
             <a:endParaRPr lang="en-US"/>
           </a:p>
@@ -2405,7 +2405,7 @@
           <a:p>
             <a:fld id="{FE400534-9B4E-43CC-9E90-F3FF0615A88D}" type="datetimeFigureOut">
               <a:rPr lang="en-US" smtClean="0"/>
-              <a:t>10/28/2018</a:t>
+              <a:t>10/30/2018</a:t>
             </a:fld>
             <a:endParaRPr lang="en-US"/>
           </a:p>
@@ -2693,7 +2693,7 @@
           <a:p>
             <a:fld id="{FE400534-9B4E-43CC-9E90-F3FF0615A88D}" type="datetimeFigureOut">
               <a:rPr lang="en-US" smtClean="0"/>
-              <a:t>10/28/2018</a:t>
+              <a:t>10/30/2018</a:t>
             </a:fld>
             <a:endParaRPr lang="en-US"/>
           </a:p>
@@ -2934,7 +2934,7 @@
           <a:p>
             <a:fld id="{FE400534-9B4E-43CC-9E90-F3FF0615A88D}" type="datetimeFigureOut">
               <a:rPr lang="en-US" smtClean="0"/>
-              <a:t>10/28/2018</a:t>
+              <a:t>10/30/2018</a:t>
             </a:fld>
             <a:endParaRPr lang="en-US"/>
           </a:p>
@@ -4938,6 +4938,7 @@
           <a:bodyPr/>
           <a:lstStyle/>
           <a:p>
+            <a:pPr algn="ctr"/>
             <a:r>
               <a:rPr lang="en-US" dirty="0"/>
               <a:t>Results (Student)</a:t>

</xml_diff>